<commit_message>
Chap01: Corrections done until 'Cr in CdTe'. Article on exchange to be read again; intro on exchange eh to be worked on.
</commit_message>
<xml_diff>
--- a/01-QD/Pictures/CrinIIVI.pptx
+++ b/01-QD/Pictures/CrinIIVI.pptx
@@ -192,7 +192,7 @@
           <a:p>
             <a:fld id="{846E01DE-34E9-49ED-964F-82AFB8FEED8D}" type="datetimeFigureOut">
               <a:rPr lang="en-US" smtClean="0"/>
-              <a:t>6/29/2017</a:t>
+              <a:t>7/7/2017</a:t>
             </a:fld>
             <a:endParaRPr lang="en-US"/>
           </a:p>
@@ -730,7 +730,7 @@
           <a:p>
             <a:fld id="{E8FDFF63-9793-40E2-8DBC-13016F069603}" type="datetimeFigureOut">
               <a:rPr lang="en-US" smtClean="0"/>
-              <a:t>6/29/2017</a:t>
+              <a:t>7/7/2017</a:t>
             </a:fld>
             <a:endParaRPr lang="en-US"/>
           </a:p>
@@ -900,7 +900,7 @@
           <a:p>
             <a:fld id="{E8FDFF63-9793-40E2-8DBC-13016F069603}" type="datetimeFigureOut">
               <a:rPr lang="en-US" smtClean="0"/>
-              <a:t>6/29/2017</a:t>
+              <a:t>7/7/2017</a:t>
             </a:fld>
             <a:endParaRPr lang="en-US"/>
           </a:p>
@@ -1080,7 +1080,7 @@
           <a:p>
             <a:fld id="{E8FDFF63-9793-40E2-8DBC-13016F069603}" type="datetimeFigureOut">
               <a:rPr lang="en-US" smtClean="0"/>
-              <a:t>6/29/2017</a:t>
+              <a:t>7/7/2017</a:t>
             </a:fld>
             <a:endParaRPr lang="en-US"/>
           </a:p>
@@ -1250,7 +1250,7 @@
           <a:p>
             <a:fld id="{E8FDFF63-9793-40E2-8DBC-13016F069603}" type="datetimeFigureOut">
               <a:rPr lang="en-US" smtClean="0"/>
-              <a:t>6/29/2017</a:t>
+              <a:t>7/7/2017</a:t>
             </a:fld>
             <a:endParaRPr lang="en-US"/>
           </a:p>
@@ -1496,7 +1496,7 @@
           <a:p>
             <a:fld id="{E8FDFF63-9793-40E2-8DBC-13016F069603}" type="datetimeFigureOut">
               <a:rPr lang="en-US" smtClean="0"/>
-              <a:t>6/29/2017</a:t>
+              <a:t>7/7/2017</a:t>
             </a:fld>
             <a:endParaRPr lang="en-US"/>
           </a:p>
@@ -1784,7 +1784,7 @@
           <a:p>
             <a:fld id="{E8FDFF63-9793-40E2-8DBC-13016F069603}" type="datetimeFigureOut">
               <a:rPr lang="en-US" smtClean="0"/>
-              <a:t>6/29/2017</a:t>
+              <a:t>7/7/2017</a:t>
             </a:fld>
             <a:endParaRPr lang="en-US"/>
           </a:p>
@@ -2206,7 +2206,7 @@
           <a:p>
             <a:fld id="{E8FDFF63-9793-40E2-8DBC-13016F069603}" type="datetimeFigureOut">
               <a:rPr lang="en-US" smtClean="0"/>
-              <a:t>6/29/2017</a:t>
+              <a:t>7/7/2017</a:t>
             </a:fld>
             <a:endParaRPr lang="en-US"/>
           </a:p>
@@ -2324,7 +2324,7 @@
           <a:p>
             <a:fld id="{E8FDFF63-9793-40E2-8DBC-13016F069603}" type="datetimeFigureOut">
               <a:rPr lang="en-US" smtClean="0"/>
-              <a:t>6/29/2017</a:t>
+              <a:t>7/7/2017</a:t>
             </a:fld>
             <a:endParaRPr lang="en-US"/>
           </a:p>
@@ -2419,7 +2419,7 @@
           <a:p>
             <a:fld id="{E8FDFF63-9793-40E2-8DBC-13016F069603}" type="datetimeFigureOut">
               <a:rPr lang="en-US" smtClean="0"/>
-              <a:t>6/29/2017</a:t>
+              <a:t>7/7/2017</a:t>
             </a:fld>
             <a:endParaRPr lang="en-US"/>
           </a:p>
@@ -2696,7 +2696,7 @@
           <a:p>
             <a:fld id="{E8FDFF63-9793-40E2-8DBC-13016F069603}" type="datetimeFigureOut">
               <a:rPr lang="en-US" smtClean="0"/>
-              <a:t>6/29/2017</a:t>
+              <a:t>7/7/2017</a:t>
             </a:fld>
             <a:endParaRPr lang="en-US"/>
           </a:p>
@@ -2949,7 +2949,7 @@
           <a:p>
             <a:fld id="{E8FDFF63-9793-40E2-8DBC-13016F069603}" type="datetimeFigureOut">
               <a:rPr lang="en-US" smtClean="0"/>
-              <a:t>6/29/2017</a:t>
+              <a:t>7/7/2017</a:t>
             </a:fld>
             <a:endParaRPr lang="en-US"/>
           </a:p>
@@ -3162,7 +3162,7 @@
           <a:p>
             <a:fld id="{E8FDFF63-9793-40E2-8DBC-13016F069603}" type="datetimeFigureOut">
               <a:rPr lang="en-US" smtClean="0"/>
-              <a:t>6/29/2017</a:t>
+              <a:t>7/7/2017</a:t>
             </a:fld>
             <a:endParaRPr lang="en-US"/>
           </a:p>
@@ -4153,8 +4153,8 @@
           </p:nvSpPr>
           <p:spPr>
             <a:xfrm>
-              <a:off x="3194516" y="35496"/>
-              <a:ext cx="1218603" cy="523220"/>
+              <a:off x="3309004" y="35496"/>
+              <a:ext cx="989630" cy="523220"/>
             </a:xfrm>
             <a:prstGeom prst="rect">
               <a:avLst/>
@@ -4173,26 +4173,15 @@
                   <a:latin typeface="Times New Roman" panose="02020603050405020304" pitchFamily="18" charset="0"/>
                   <a:cs typeface="Times New Roman" panose="02020603050405020304" pitchFamily="18" charset="0"/>
                 </a:rPr>
-                <a:t>Biaxial</a:t>
+                <a:t>Jahn</a:t>
               </a:r>
               <a:r>
                 <a:rPr lang="fr-FR" sz="1400" dirty="0" smtClean="0">
                   <a:latin typeface="Times New Roman" panose="02020603050405020304" pitchFamily="18" charset="0"/>
                   <a:cs typeface="Times New Roman" panose="02020603050405020304" pitchFamily="18" charset="0"/>
                 </a:rPr>
-                <a:t> </a:t>
+                <a:t>-Teller</a:t>
               </a:r>
-              <a:r>
-                <a:rPr lang="fr-FR" sz="1400" dirty="0" err="1" smtClean="0">
-                  <a:latin typeface="Times New Roman" panose="02020603050405020304" pitchFamily="18" charset="0"/>
-                  <a:cs typeface="Times New Roman" panose="02020603050405020304" pitchFamily="18" charset="0"/>
-                </a:rPr>
-                <a:t>strains</a:t>
-              </a:r>
-              <a:endParaRPr lang="fr-FR" sz="1400" dirty="0" smtClean="0">
-                <a:latin typeface="Times New Roman" panose="02020603050405020304" pitchFamily="18" charset="0"/>
-                <a:cs typeface="Times New Roman" panose="02020603050405020304" pitchFamily="18" charset="0"/>
-              </a:endParaRPr>
             </a:p>
             <a:p>
               <a:pPr algn="ctr"/>
@@ -4771,8 +4760,8 @@
           </p:nvSpPr>
           <p:spPr>
             <a:xfrm>
-              <a:off x="2636912" y="1763688"/>
-              <a:ext cx="295274" cy="307777"/>
+              <a:off x="2636912" y="1619672"/>
+              <a:ext cx="1003736" cy="307777"/>
             </a:xfrm>
             <a:prstGeom prst="rect">
               <a:avLst/>
@@ -4791,8 +4780,16 @@
                 </a:rPr>
                 <a:t>D</a:t>
               </a:r>
+              <a:r>
+                <a:rPr lang="fr-FR" sz="1400" dirty="0" smtClean="0">
+                  <a:latin typeface="Times New Roman" panose="02020603050405020304" pitchFamily="18" charset="0"/>
+                  <a:cs typeface="Times New Roman" panose="02020603050405020304" pitchFamily="18" charset="0"/>
+                </a:rPr>
+                <a:t> ~ 0.5 eV </a:t>
+              </a:r>
               <a:endParaRPr lang="en-US" sz="1400" dirty="0">
-                <a:latin typeface="Symbol" panose="05050102010706020507" pitchFamily="18" charset="2"/>
+                <a:latin typeface="Times New Roman" panose="02020603050405020304" pitchFamily="18" charset="0"/>
+                <a:cs typeface="Times New Roman" panose="02020603050405020304" pitchFamily="18" charset="0"/>
               </a:endParaRPr>
             </a:p>
           </p:txBody>

</xml_diff>